<commit_message>
Updated for latest version of HDInsight Emulator
</commit_message>
<xml_diff>
--- a/FromZeroToHadoop/HadoopKickStarterForTheMicrosoftPlatform.pptx
+++ b/FromZeroToHadoop/HadoopKickStarterForTheMicrosoftPlatform.pptx
@@ -264,7 +264,7 @@
           <a:p>
             <a:fld id="{AC76EF53-94ED-41C7-BFC9-68B5688A2A9E}" type="datetimeFigureOut">
               <a:rPr lang="en-GB" smtClean="0"/>
-              <a:t>15/10/2014</a:t>
+              <a:t>28/11/2014</a:t>
             </a:fld>
             <a:endParaRPr lang="en-GB"/>
           </a:p>
@@ -434,7 +434,7 @@
           <a:p>
             <a:fld id="{AC76EF53-94ED-41C7-BFC9-68B5688A2A9E}" type="datetimeFigureOut">
               <a:rPr lang="en-GB" smtClean="0"/>
-              <a:t>15/10/2014</a:t>
+              <a:t>28/11/2014</a:t>
             </a:fld>
             <a:endParaRPr lang="en-GB"/>
           </a:p>
@@ -614,7 +614,7 @@
           <a:p>
             <a:fld id="{AC76EF53-94ED-41C7-BFC9-68B5688A2A9E}" type="datetimeFigureOut">
               <a:rPr lang="en-GB" smtClean="0"/>
-              <a:t>15/10/2014</a:t>
+              <a:t>28/11/2014</a:t>
             </a:fld>
             <a:endParaRPr lang="en-GB"/>
           </a:p>
@@ -784,7 +784,7 @@
           <a:p>
             <a:fld id="{AC76EF53-94ED-41C7-BFC9-68B5688A2A9E}" type="datetimeFigureOut">
               <a:rPr lang="en-GB" smtClean="0"/>
-              <a:t>15/10/2014</a:t>
+              <a:t>28/11/2014</a:t>
             </a:fld>
             <a:endParaRPr lang="en-GB"/>
           </a:p>
@@ -1030,7 +1030,7 @@
           <a:p>
             <a:fld id="{AC76EF53-94ED-41C7-BFC9-68B5688A2A9E}" type="datetimeFigureOut">
               <a:rPr lang="en-GB" smtClean="0"/>
-              <a:t>15/10/2014</a:t>
+              <a:t>28/11/2014</a:t>
             </a:fld>
             <a:endParaRPr lang="en-GB"/>
           </a:p>
@@ -1262,7 +1262,7 @@
           <a:p>
             <a:fld id="{AC76EF53-94ED-41C7-BFC9-68B5688A2A9E}" type="datetimeFigureOut">
               <a:rPr lang="en-GB" smtClean="0"/>
-              <a:t>15/10/2014</a:t>
+              <a:t>28/11/2014</a:t>
             </a:fld>
             <a:endParaRPr lang="en-GB"/>
           </a:p>
@@ -1629,7 +1629,7 @@
           <a:p>
             <a:fld id="{AC76EF53-94ED-41C7-BFC9-68B5688A2A9E}" type="datetimeFigureOut">
               <a:rPr lang="en-GB" smtClean="0"/>
-              <a:t>15/10/2014</a:t>
+              <a:t>28/11/2014</a:t>
             </a:fld>
             <a:endParaRPr lang="en-GB"/>
           </a:p>
@@ -1747,7 +1747,7 @@
           <a:p>
             <a:fld id="{AC76EF53-94ED-41C7-BFC9-68B5688A2A9E}" type="datetimeFigureOut">
               <a:rPr lang="en-GB" smtClean="0"/>
-              <a:t>15/10/2014</a:t>
+              <a:t>28/11/2014</a:t>
             </a:fld>
             <a:endParaRPr lang="en-GB"/>
           </a:p>
@@ -1842,7 +1842,7 @@
           <a:p>
             <a:fld id="{AC76EF53-94ED-41C7-BFC9-68B5688A2A9E}" type="datetimeFigureOut">
               <a:rPr lang="en-GB" smtClean="0"/>
-              <a:t>15/10/2014</a:t>
+              <a:t>28/11/2014</a:t>
             </a:fld>
             <a:endParaRPr lang="en-GB"/>
           </a:p>
@@ -2119,7 +2119,7 @@
           <a:p>
             <a:fld id="{AC76EF53-94ED-41C7-BFC9-68B5688A2A9E}" type="datetimeFigureOut">
               <a:rPr lang="en-GB" smtClean="0"/>
-              <a:t>15/10/2014</a:t>
+              <a:t>28/11/2014</a:t>
             </a:fld>
             <a:endParaRPr lang="en-GB"/>
           </a:p>
@@ -2376,7 +2376,7 @@
           <a:p>
             <a:fld id="{AC76EF53-94ED-41C7-BFC9-68B5688A2A9E}" type="datetimeFigureOut">
               <a:rPr lang="en-GB" smtClean="0"/>
-              <a:t>15/10/2014</a:t>
+              <a:t>28/11/2014</a:t>
             </a:fld>
             <a:endParaRPr lang="en-GB"/>
           </a:p>
@@ -2589,7 +2589,7 @@
           <a:p>
             <a:fld id="{AC76EF53-94ED-41C7-BFC9-68B5688A2A9E}" type="datetimeFigureOut">
               <a:rPr lang="en-GB" smtClean="0"/>
-              <a:t>15/10/2014</a:t>
+              <a:t>28/11/2014</a:t>
             </a:fld>
             <a:endParaRPr lang="en-GB"/>
           </a:p>
@@ -3941,7 +3941,7 @@
         </p:spPr>
         <p:txBody>
           <a:bodyPr>
-            <a:normAutofit lnSpcReduction="10000"/>
+            <a:normAutofit fontScale="92500" lnSpcReduction="20000"/>
           </a:bodyPr>
           <a:lstStyle/>
           <a:p>
@@ -3981,8 +3981,19 @@
           <a:p>
             <a:r>
               <a:rPr lang="en-GB" dirty="0" smtClean="0"/>
-              <a:t>Predictive Analytics</a:t>
-            </a:r>
+              <a:t>Predictive </a:t>
+            </a:r>
+            <a:r>
+              <a:rPr lang="en-GB" dirty="0" smtClean="0"/>
+              <a:t>Analytics</a:t>
+            </a:r>
+          </a:p>
+          <a:p>
+            <a:r>
+              <a:rPr lang="en-GB" dirty="0" smtClean="0"/>
+              <a:t>Machine Vision</a:t>
+            </a:r>
+            <a:endParaRPr lang="en-GB" dirty="0" smtClean="0"/>
           </a:p>
           <a:p>
             <a:r>
@@ -4500,21 +4511,13 @@
           <a:p>
             <a:r>
               <a:rPr lang="en-GB" dirty="0" smtClean="0"/>
-              <a:t>How do I visualize my results</a:t>
-            </a:r>
+              <a:t>How do I visualize my results?</a:t>
+            </a:r>
+          </a:p>
+          <a:p>
             <a:r>
               <a:rPr lang="en-GB" dirty="0" smtClean="0"/>
-              <a:t>?</a:t>
-            </a:r>
-          </a:p>
-          <a:p>
-            <a:r>
-              <a:rPr lang="en-GB" dirty="0" smtClean="0"/>
-              <a:t>Questions</a:t>
-            </a:r>
-            <a:r>
-              <a:rPr lang="en-GB" dirty="0" smtClean="0"/>
-              <a:t>?</a:t>
+              <a:t>Questions?</a:t>
             </a:r>
           </a:p>
         </p:txBody>

</xml_diff>